<commit_message>
Added height to patient information criteria
Adding height to patient information criteria for user roles
presentation
</commit_message>
<xml_diff>
--- a/Misc/Presentation_-_User_Roles.pptx
+++ b/Misc/Presentation_-_User_Roles.pptx
@@ -4721,15 +4721,7 @@
           <a:p>
             <a:r>
               <a:rPr lang="en-US" dirty="0" smtClean="0"/>
-              <a:t>Patients will </a:t>
-            </a:r>
-            <a:r>
-              <a:rPr lang="en-US" dirty="0" smtClean="0"/>
-              <a:t>only </a:t>
-            </a:r>
-            <a:r>
-              <a:rPr lang="en-US" dirty="0" smtClean="0"/>
-              <a:t>be associated with one physician.</a:t>
+              <a:t>Patients will only be associated with one physician.</a:t>
             </a:r>
           </a:p>
           <a:p>
@@ -4820,25 +4812,13 @@
           <a:p>
             <a:r>
               <a:rPr lang="en-US" dirty="0" smtClean="0"/>
-              <a:t>Patient accounts will not </a:t>
-            </a:r>
+              <a:t>Patient accounts will not have any personal identifiable information</a:t>
+            </a:r>
+          </a:p>
+          <a:p>
             <a:r>
               <a:rPr lang="en-US" dirty="0" smtClean="0"/>
-              <a:t>have any personal identifiable information</a:t>
-            </a:r>
-          </a:p>
-          <a:p>
-            <a:r>
-              <a:rPr lang="en-US" dirty="0" smtClean="0"/>
-              <a:t>Since there is no PII, password </a:t>
-            </a:r>
-            <a:r>
-              <a:rPr lang="en-US" dirty="0" smtClean="0"/>
-              <a:t>resetting will be performed with either security questions or a temporary password will be mailed to a “call-back email</a:t>
-            </a:r>
-            <a:r>
-              <a:rPr lang="en-US" dirty="0" smtClean="0"/>
-              <a:t>”</a:t>
+              <a:t>Since there is no PII, password resetting will be performed with either security questions or a temporary password will be mailed to a “call-back email”</a:t>
             </a:r>
           </a:p>
           <a:p>
@@ -4852,7 +4832,15 @@
             </a:r>
             <a:r>
               <a:rPr lang="en-US" dirty="0" smtClean="0"/>
-              <a:t>, username, password, age, gender, weight, and location (at a high-level to not be identifiable, i.e. state) </a:t>
+              <a:t>, username, password, age, gender, weight</a:t>
+            </a:r>
+            <a:r>
+              <a:rPr lang="en-US" dirty="0" smtClean="0"/>
+              <a:t>, height </a:t>
+            </a:r>
+            <a:r>
+              <a:rPr lang="en-US" dirty="0" smtClean="0"/>
+              <a:t>and location (at a high-level to not be identifiable, i.e. state) </a:t>
             </a:r>
           </a:p>
           <a:p>
@@ -4860,7 +4848,6 @@
               <a:rPr lang="en-US" dirty="0" smtClean="0"/>
               <a:t>Patients will only be allowed to upload data and view their own data.</a:t>
             </a:r>
-            <a:endParaRPr lang="en-US" dirty="0" smtClean="0"/>
           </a:p>
           <a:p>
             <a:endParaRPr lang="en-US" dirty="0"/>

</xml_diff>